<commit_message>
add AI_PPT latest version
</commit_message>
<xml_diff>
--- a/AI_PPT.pptx
+++ b/AI_PPT.pptx
@@ -22,6 +22,7 @@
     <p:sldId id="274" r:id="rId16"/>
     <p:sldId id="275" r:id="rId17"/>
     <p:sldId id="276" r:id="rId18"/>
+    <p:sldId id="277" r:id="rId19"/>
   </p:sldIdLst>
   <p:sldSz cx="12192000" cy="6858000"/>
   <p:notesSz cx="6858000" cy="9144000"/>
@@ -275,7 +276,7 @@
           <a:p>
             <a:fld id="{D42B2BBA-7919-4E37-BA41-DD76E11569D4}" type="datetimeFigureOut">
               <a:rPr lang="en-US" smtClean="0"/>
-              <a:t>11/25/2019</a:t>
+              <a:t>11/30/2019</a:t>
             </a:fld>
             <a:endParaRPr lang="en-US"/>
           </a:p>
@@ -473,7 +474,7 @@
           <a:p>
             <a:fld id="{D42B2BBA-7919-4E37-BA41-DD76E11569D4}" type="datetimeFigureOut">
               <a:rPr lang="en-US" smtClean="0"/>
-              <a:t>11/25/2019</a:t>
+              <a:t>11/30/2019</a:t>
             </a:fld>
             <a:endParaRPr lang="en-US"/>
           </a:p>
@@ -681,7 +682,7 @@
           <a:p>
             <a:fld id="{D42B2BBA-7919-4E37-BA41-DD76E11569D4}" type="datetimeFigureOut">
               <a:rPr lang="en-US" smtClean="0"/>
-              <a:t>11/25/2019</a:t>
+              <a:t>11/30/2019</a:t>
             </a:fld>
             <a:endParaRPr lang="en-US"/>
           </a:p>
@@ -879,7 +880,7 @@
           <a:p>
             <a:fld id="{D42B2BBA-7919-4E37-BA41-DD76E11569D4}" type="datetimeFigureOut">
               <a:rPr lang="en-US" smtClean="0"/>
-              <a:t>11/25/2019</a:t>
+              <a:t>11/30/2019</a:t>
             </a:fld>
             <a:endParaRPr lang="en-US"/>
           </a:p>
@@ -1154,7 +1155,7 @@
           <a:p>
             <a:fld id="{D42B2BBA-7919-4E37-BA41-DD76E11569D4}" type="datetimeFigureOut">
               <a:rPr lang="en-US" smtClean="0"/>
-              <a:t>11/25/2019</a:t>
+              <a:t>11/30/2019</a:t>
             </a:fld>
             <a:endParaRPr lang="en-US"/>
           </a:p>
@@ -1419,7 +1420,7 @@
           <a:p>
             <a:fld id="{D42B2BBA-7919-4E37-BA41-DD76E11569D4}" type="datetimeFigureOut">
               <a:rPr lang="en-US" smtClean="0"/>
-              <a:t>11/25/2019</a:t>
+              <a:t>11/30/2019</a:t>
             </a:fld>
             <a:endParaRPr lang="en-US"/>
           </a:p>
@@ -1831,7 +1832,7 @@
           <a:p>
             <a:fld id="{D42B2BBA-7919-4E37-BA41-DD76E11569D4}" type="datetimeFigureOut">
               <a:rPr lang="en-US" smtClean="0"/>
-              <a:t>11/25/2019</a:t>
+              <a:t>11/30/2019</a:t>
             </a:fld>
             <a:endParaRPr lang="en-US"/>
           </a:p>
@@ -1972,7 +1973,7 @@
           <a:p>
             <a:fld id="{D42B2BBA-7919-4E37-BA41-DD76E11569D4}" type="datetimeFigureOut">
               <a:rPr lang="en-US" smtClean="0"/>
-              <a:t>11/25/2019</a:t>
+              <a:t>11/30/2019</a:t>
             </a:fld>
             <a:endParaRPr lang="en-US"/>
           </a:p>
@@ -2085,7 +2086,7 @@
           <a:p>
             <a:fld id="{D42B2BBA-7919-4E37-BA41-DD76E11569D4}" type="datetimeFigureOut">
               <a:rPr lang="en-US" smtClean="0"/>
-              <a:t>11/25/2019</a:t>
+              <a:t>11/30/2019</a:t>
             </a:fld>
             <a:endParaRPr lang="en-US"/>
           </a:p>
@@ -2396,7 +2397,7 @@
           <a:p>
             <a:fld id="{D42B2BBA-7919-4E37-BA41-DD76E11569D4}" type="datetimeFigureOut">
               <a:rPr lang="en-US" smtClean="0"/>
-              <a:t>11/25/2019</a:t>
+              <a:t>11/30/2019</a:t>
             </a:fld>
             <a:endParaRPr lang="en-US"/>
           </a:p>
@@ -2684,7 +2685,7 @@
           <a:p>
             <a:fld id="{D42B2BBA-7919-4E37-BA41-DD76E11569D4}" type="datetimeFigureOut">
               <a:rPr lang="en-US" smtClean="0"/>
-              <a:t>11/25/2019</a:t>
+              <a:t>11/30/2019</a:t>
             </a:fld>
             <a:endParaRPr lang="en-US"/>
           </a:p>
@@ -2925,7 +2926,7 @@
           <a:p>
             <a:fld id="{D42B2BBA-7919-4E37-BA41-DD76E11569D4}" type="datetimeFigureOut">
               <a:rPr lang="en-US" smtClean="0"/>
-              <a:t>11/25/2019</a:t>
+              <a:t>11/30/2019</a:t>
             </a:fld>
             <a:endParaRPr lang="en-US"/>
           </a:p>
@@ -3375,6 +3376,35 @@
           </a:p>
         </p:txBody>
       </p:sp>
+      <p:sp>
+        <p:nvSpPr>
+          <p:cNvPr id="4" name="Subtitle 3">
+            <a:extLst>
+              <a:ext uri="{FF2B5EF4-FFF2-40B4-BE49-F238E27FC236}">
+                <a16:creationId xmlns:a16="http://schemas.microsoft.com/office/drawing/2014/main" id="{FB51B9C2-3AE7-4214-A3EF-5521FB202C78}"/>
+              </a:ext>
+            </a:extLst>
+          </p:cNvPr>
+          <p:cNvSpPr>
+            <a:spLocks noGrp="1"/>
+          </p:cNvSpPr>
+          <p:nvPr>
+            <p:ph type="subTitle" idx="1"/>
+          </p:nvPr>
+        </p:nvSpPr>
+        <p:spPr/>
+        <p:txBody>
+          <a:bodyPr/>
+          <a:lstStyle/>
+          <a:p>
+            <a:r>
+              <a:rPr lang="zh-CN" altLang="en-US" dirty="0"/>
+              <a:t>踩坑之旅</a:t>
+            </a:r>
+            <a:endParaRPr lang="en-US" dirty="0"/>
+          </a:p>
+        </p:txBody>
+      </p:sp>
     </p:spTree>
     <p:extLst>
       <p:ext uri="{BB962C8B-B14F-4D97-AF65-F5344CB8AC3E}">
@@ -4547,7 +4577,7 @@
         <p:spPr>
           <a:xfrm>
             <a:off x="2660337" y="3679984"/>
-            <a:ext cx="1913001" cy="1200329"/>
+            <a:ext cx="1913001" cy="1477328"/>
           </a:xfrm>
           <a:prstGeom prst="rect">
             <a:avLst/>
@@ -4573,6 +4603,12 @@
             <a:r>
               <a:rPr lang="en-US" dirty="0"/>
               <a:t>LLVM</a:t>
+            </a:r>
+          </a:p>
+          <a:p>
+            <a:r>
+              <a:rPr lang="en-US" dirty="0"/>
+              <a:t>MLIR</a:t>
             </a:r>
           </a:p>
           <a:p>
@@ -6260,8 +6296,13 @@
             <a:pPr lvl="1"/>
             <a:r>
               <a:rPr lang="en-US" altLang="zh-CN" dirty="0"/>
-              <a:t>LLVM IR </a:t>
-            </a:r>
+              <a:t>TensorFlow </a:t>
+            </a:r>
+            <a:r>
+              <a:rPr lang="en-US" altLang="zh-CN"/>
+              <a:t>XLA compiler </a:t>
+            </a:r>
+            <a:endParaRPr lang="en-US" altLang="zh-CN" dirty="0"/>
           </a:p>
           <a:p>
             <a:pPr lvl="2"/>
@@ -6482,7 +6523,7 @@
           <a:p>
             <a:r>
               <a:rPr lang="en-US" altLang="zh-CN" dirty="0"/>
-              <a:t>FP32 -&gt; FP16 -&gt; </a:t>
+              <a:t>FP32 -&gt; FP16 -&gt; INT -&gt; </a:t>
             </a:r>
             <a:r>
               <a:rPr lang="zh-CN" altLang="en-US" dirty="0"/>
@@ -6775,6 +6816,89 @@
     <p:extLst>
       <p:ext uri="{BB962C8B-B14F-4D97-AF65-F5344CB8AC3E}">
         <p14:creationId xmlns:p14="http://schemas.microsoft.com/office/powerpoint/2010/main" val="292998662"/>
+      </p:ext>
+    </p:extLst>
+  </p:cSld>
+  <p:clrMapOvr>
+    <a:masterClrMapping/>
+  </p:clrMapOvr>
+</p:sld>
+</file>
+
+<file path=ppt/slides/slide18.xml><?xml version="1.0" encoding="utf-8"?>
+<p:sld xmlns:a="http://schemas.openxmlformats.org/drawingml/2006/main" xmlns:r="http://schemas.openxmlformats.org/officeDocument/2006/relationships" xmlns:p="http://schemas.openxmlformats.org/presentationml/2006/main">
+  <p:cSld>
+    <p:spTree>
+      <p:nvGrpSpPr>
+        <p:cNvPr id="1" name=""/>
+        <p:cNvGrpSpPr/>
+        <p:nvPr/>
+      </p:nvGrpSpPr>
+      <p:grpSpPr>
+        <a:xfrm>
+          <a:off x="0" y="0"/>
+          <a:ext cx="0" cy="0"/>
+          <a:chOff x="0" y="0"/>
+          <a:chExt cx="0" cy="0"/>
+        </a:xfrm>
+      </p:grpSpPr>
+      <p:sp>
+        <p:nvSpPr>
+          <p:cNvPr id="2" name="Title 1">
+            <a:extLst>
+              <a:ext uri="{FF2B5EF4-FFF2-40B4-BE49-F238E27FC236}">
+                <a16:creationId xmlns:a16="http://schemas.microsoft.com/office/drawing/2014/main" id="{82A84BE7-DCA7-4ACF-A162-298211E38DB7}"/>
+              </a:ext>
+            </a:extLst>
+          </p:cNvPr>
+          <p:cNvSpPr>
+            <a:spLocks noGrp="1"/>
+          </p:cNvSpPr>
+          <p:nvPr>
+            <p:ph type="title"/>
+          </p:nvPr>
+        </p:nvSpPr>
+        <p:spPr/>
+        <p:txBody>
+          <a:bodyPr/>
+          <a:lstStyle/>
+          <a:p>
+            <a:r>
+              <a:rPr lang="en-US" altLang="zh-CN" dirty="0"/>
+              <a:t>Q&amp;A</a:t>
+            </a:r>
+          </a:p>
+        </p:txBody>
+      </p:sp>
+      <p:sp>
+        <p:nvSpPr>
+          <p:cNvPr id="3" name="Content Placeholder 2">
+            <a:extLst>
+              <a:ext uri="{FF2B5EF4-FFF2-40B4-BE49-F238E27FC236}">
+                <a16:creationId xmlns:a16="http://schemas.microsoft.com/office/drawing/2014/main" id="{970795F7-EF43-45DD-97D3-C96A42A6FE24}"/>
+              </a:ext>
+            </a:extLst>
+          </p:cNvPr>
+          <p:cNvSpPr>
+            <a:spLocks noGrp="1"/>
+          </p:cNvSpPr>
+          <p:nvPr>
+            <p:ph idx="1"/>
+          </p:nvPr>
+        </p:nvSpPr>
+        <p:spPr/>
+        <p:txBody>
+          <a:bodyPr/>
+          <a:lstStyle/>
+          <a:p>
+            <a:endParaRPr lang="en-US" altLang="zh-CN" dirty="0"/>
+          </a:p>
+        </p:txBody>
+      </p:sp>
+    </p:spTree>
+    <p:extLst>
+      <p:ext uri="{BB962C8B-B14F-4D97-AF65-F5344CB8AC3E}">
+        <p14:creationId xmlns:p14="http://schemas.microsoft.com/office/powerpoint/2010/main" val="2136098998"/>
       </p:ext>
     </p:extLst>
   </p:cSld>

</xml_diff>